<commit_message>
hi, this is not the final version, wwaiting for updates
</commit_message>
<xml_diff>
--- a/codeforhood.pptx
+++ b/codeforhood.pptx
@@ -110,6 +110,11 @@
       </a:defRPr>
     </a:lvl9pPr>
   </p:defaultTextStyle>
+  <p:extLst>
+    <p:ext uri="{EFAFB233-063F-42B5-8137-9DF3F51BA10A}">
+      <p15:sldGuideLst xmlns:p15="http://schemas.microsoft.com/office/powerpoint/2012/main"/>
+    </p:ext>
+  </p:extLst>
 </p:presentation>
 </file>
 
@@ -1778,7 +1783,7 @@
 <dgm:dataModel xmlns:dgm="http://schemas.openxmlformats.org/drawingml/2006/diagram" xmlns:a="http://schemas.openxmlformats.org/drawingml/2006/main">
   <dgm:ptLst>
     <dgm:pt modelId="{7514BB55-BBBD-4B47-95C0-C62C973DD5A7}" type="doc">
-      <dgm:prSet loTypeId="urn:microsoft.com/office/officeart/2016/7/layout/RepeatingBendingProcessNew" loCatId="process" qsTypeId="urn:microsoft.com/office/officeart/2005/8/quickstyle/simple1" qsCatId="simple" csTypeId="urn:microsoft.com/office/officeart/2005/8/colors/accent2_3" csCatId="accent2"/>
+      <dgm:prSet loTypeId="urn:microsoft.com/office/officeart/2016/7/layout/RepeatingBendingProcessNew" loCatId="process" qsTypeId="urn:microsoft.com/office/officeart/2005/8/quickstyle/simple1" qsCatId="simple" csTypeId="urn:microsoft.com/office/officeart/2005/8/colors/accent2_3" csCatId="accent2" phldr="1"/>
       <dgm:spPr/>
       <dgm:t>
         <a:bodyPr/>
@@ -1870,10 +1875,10 @@
         <a:lstStyle/>
         <a:p>
           <a:r>
-            <a:rPr lang="en-GB"/>
-            <a:t>The quiz is using open source data with 5 attributes for four countries-United Kingdom, Rwanda,I ndia,Indonesia</a:t>
+            <a:rPr lang="en-GB" dirty="0"/>
+            <a:t>The quiz is using open source data with 5 attributes for four countries-United Kingdom, Rwanda ,India, Indonesia.</a:t>
           </a:r>
-          <a:endParaRPr lang="en-US"/>
+          <a:endParaRPr lang="en-US" dirty="0"/>
         </a:p>
       </dgm:t>
     </dgm:pt>
@@ -2172,10 +2177,10 @@
         <a:lstStyle/>
         <a:p>
           <a:r>
-            <a:rPr lang="en-GB"/>
-            <a:t>Employment to population ratio (ages 15-24 female) </a:t>
+            <a:rPr lang="en-GB" dirty="0"/>
+            <a:t>employment to population ratio (ages 15-24 female) </a:t>
           </a:r>
-          <a:endParaRPr lang="en-US"/>
+          <a:endParaRPr lang="en-US" dirty="0"/>
         </a:p>
       </dgm:t>
     </dgm:pt>
@@ -2210,7 +2215,7 @@
         <a:p>
           <a:r>
             <a:rPr lang="en-GB" dirty="0"/>
-            <a:t>Underage pregnancy </a:t>
+            <a:t>underage pregnancy </a:t>
           </a:r>
           <a:endParaRPr lang="en-US" dirty="0"/>
         </a:p>
@@ -2824,10 +2829,10 @@
             <a:buNone/>
           </a:pPr>
           <a:r>
-            <a:rPr lang="en-GB" sz="1600" kern="1200"/>
-            <a:t>The quiz is using open source data with 5 attributes for four countries-United Kingdom, Rwanda,I ndia,Indonesia</a:t>
+            <a:rPr lang="en-GB" sz="1600" kern="1200" dirty="0"/>
+            <a:t>The quiz is using open source data with 5 attributes for four countries-United Kingdom, Rwanda ,India, Indonesia.</a:t>
           </a:r>
-          <a:endParaRPr lang="en-US" sz="1600" kern="1200"/>
+          <a:endParaRPr lang="en-US" sz="1600" kern="1200" dirty="0"/>
         </a:p>
       </dsp:txBody>
       <dsp:txXfrm>
@@ -3227,10 +3232,10 @@
             <a:buNone/>
           </a:pPr>
           <a:r>
-            <a:rPr lang="en-GB" sz="2400" kern="1200"/>
-            <a:t>Employment to population ratio (ages 15-24 female) </a:t>
+            <a:rPr lang="en-GB" sz="2400" kern="1200" dirty="0"/>
+            <a:t>employment to population ratio (ages 15-24 female) </a:t>
           </a:r>
-          <a:endParaRPr lang="en-US" sz="2400" kern="1200"/>
+          <a:endParaRPr lang="en-US" sz="2400" kern="1200" dirty="0"/>
         </a:p>
       </dsp:txBody>
       <dsp:txXfrm>
@@ -3306,7 +3311,7 @@
           </a:pPr>
           <a:r>
             <a:rPr lang="en-GB" sz="2400" kern="1200" dirty="0"/>
-            <a:t>Underage pregnancy </a:t>
+            <a:t>underage pregnancy </a:t>
           </a:r>
           <a:endParaRPr lang="en-US" sz="2400" kern="1200" dirty="0"/>
         </a:p>
@@ -5984,28 +5989,28 @@
       <inkml:brushProperty name="scaleFactor" value="0.5"/>
     </inkml:brush>
   </inkml:definitions>
-  <inkml:trace contextRef="#ctx0" brushRef="#br0">581 799,'0'-36,"-36"36,-1 0,1 0,0 0,-1 0,1 0,0 0,0 0,36 36,-37-36,37 37,-36-1,0 0,36 1,-37-1,37 0,-36-36,36 37,0-1,-36-36,36 36,0 0,0 1,0-1,-36-36,36 36,0 1,0-1,0 0,-37 0,37 1,0 35,0-35,0 35,0-35,0-1,0 0,0 0,0 1,0-1,0 0,0 1,0-1,0 0,37-36,-37 36,0 1,0-1,0 0,36-36,-36 37,36-1,-36 0,36 0,1-36,-1 37,0-37,-36 36,37-36,-1 36,0 1,0-37,-36 36,37-36,-37 36,36-36,-36 37,36-37,1 0,-1 0,-36 36,36-36,0 0,1 0,-1 0,0-36,37-1,-37 37,0-36,-36 0,37-1,-1 1,0 36,1 0,-37-36,0-1,36-35,-36 36,36-37,0 0,-36 37,37-36,-1-1,0 73,-36-36,0-1,37 37,-37 37,36-1,-36 0,0 1,36-37,-36 36,36 0,-36 0,37-36,-37 37,36-1,-36 0,0 1,0-1,36-36,-36 36,37-36,-37 36,36-36,-36 37,0-1,36-36,-36 36,36-36,1 37,-1-37,0 0,1 0,-1 0,0 0,0 0,1 0,-1 0,37 0,-1-73,1 37,-37-37,37 37,-37 36,-36-36,36 36,-36-37,0 1,0-37,36 37,-36 0,0 0,0-1,0 1,0-37,0 1,0-37,0 0,-36-36,36 36,-36 0,0 37,36-1,-37 37,37-1,0 1,-36 36,0 0,-1 0,1 0,36-36,-36 36,0 0,-1 0,1 0,0 0,-1 0,1 0,0 0,0 0,-1 0,1 0,0 0,-1 0,37 36,0 0,-36 1,0-1,36 0,-36-36,-1 37,1-1,0 0,36 0,0 1,-37-37,37 36,-36 37,36-37,-36 0,36 0,-36 1,-1-1,1 0,36 1,0-1,0 0,0 1,0-1,0-36</inkml:trace>
-  <inkml:trace contextRef="#ctx0" brushRef="#br1" timeOffset="3703.9181">2758 618,'36'0,"-36"36,36 37,1-1,-1 1,0-1,0-36,-36 1,0 35,0-35,37-37,-37 36,0 0,0 0,0 37,0 0,0-1,36-72,-36 73,0-37,0 0,0 1,0-1,0 0,36-36,-36 36,0 1,37-37,-37 36,0 0,0 0,0 1,36-37,-36 36,0 0,0 1,36-1,-36 0,0 0,0 1,0-1,36-36,1 0,-1 0,-36 36,36-36,1 37,-1-37,-36 36,36-36,0 0,1 0,-1 0,0 0,1 0,-1 0,0 0,-36-36,36-1,1 37,-1-36,0 0,-36-1,37 37,-1-36,36-109,-35 72,-1 1,-36 36,36-1,1 37,-37-36,0 0,0-37,0 1,0 35,0 1,0 0,-37 0,37-37,-72 0,72 37,-37-36,-35-1,-1 37,1-37,72 37,-37 0,1-1,0 37,0-36,-1 0,1 0,0-1,-1 1,1 0,0 36,0 0,36-37,-37 37,1 0,36-36,-36 36,-1 0,1 0,0 0,0 0,-1 0,1 0,0-36,-1 36,1 0,0 0,0 0,-1 0,1-36,0 36,-1 0,1 0,36 0</inkml:trace>
-  <inkml:trace contextRef="#ctx0" brushRef="#br2" timeOffset="6215.8407">4064 219,'37'36,"-1"0,0 37,-36-37,36 0,1 1,-1 35,0-36,-36 1,37-1,-37 0,36 1,-36-1,36 0,-36 0,0 1,36-1,1-36,-37 36,0 1,36-37,-36 36,0 0,36 0,-36 1,36-37,-36 36,0 0,37 1,-37-1,0 0,0 0,0 1,36-1,-36 0,36 1,-36-1,37-36,-37 36,36 0,-36 1,36-37,-36 36,0 0,0 1,36-37,1 36,-1 0,0 0,-36 1,37-1,-1 0,0 1,0-1,1-36,-1 36,0-36,1 36,-1-36,36 37,-35-37,-1 0,0 0,1 0,-1 0,0 0,0 0,1 0,35 0,-36-37,1 37,-37-36,36 36,0-36,1 36,-1 0,36 0,37-73,-72 73,-1 0,0 0,0 0,1 0,-1 0,0 0,1 0,-37 0</inkml:trace>
-  <inkml:trace contextRef="#ctx0" brushRef="#br3" timeOffset="8216.0671">4064 218,'0'-36,"37"36,-1-36,0-1,0 37,1 0,-1 0,0 0,1 0,-1 0,0 0,1 0,-1 0,0 0,0 0,1 0,-1 0,0 0,37 0,-37 0,0 0,37 0,-37 0,1 0,35 0,-35 0,-1 0,0 0,0 0,1 0,35 0,-35 0,35 0,-36 0,1 0,-1 0,0 0,-36 0</inkml:trace>
-  <inkml:trace contextRef="#ctx0" brushRef="#br4" timeOffset="9367.2734">4609 1452,'0'-37,"36"1,73 0,-37-37,37 1,0 35,-37 1,1 36,0-36,-37 36,0-37,0 37,1 0,-1 0,36 0,-35 0,-1 0,0 0,1 0,-1-36,-36 36</inkml:trace>
-  <inkml:trace contextRef="#ctx0" brushRef="#br5" timeOffset="11815.1725">1959 3339,'37'0,"-1"0,0 37,-36-1,36 0,-36 1,37-37,-1 72,0-35,-36-1,37 0,-1 0,-36 1,0-1,0 0,36-36,-36 37,0-1,36 0,-36 0,37-36,-37 37,36-1,-36 0,0 1,36-37,-36 36,0 0,36-36,-36 37,37 35,-37-36,0 1,0-1,36 0,0 1,1 35,-37-36,0 1,36 35,0-35,0-1,-36 0,0 1,37-37,-37 0</inkml:trace>
-  <inkml:trace contextRef="#ctx0" brushRef="#br6" timeOffset="13544.0298">1307 3739,'0'-37,"0"1,36 0,0 36,0 0,1 0,-1 0,0 0,1 0,35 0,1 0,-1 0,1 0,36 0,-37 0,1 0,0 0,-1 0,-72-37,36 37,-36-36,37 36,72-73,-37 37,-36-36,37 35,-37 1,37 0,-37 36,37-37,-37 1,0 36,37 0,-37 0,1 0,-1 0,0 0,0 0,1 0,-1 0,0 0,1 36,-1 1,-36-1,36-36,-36 0</inkml:trace>
-  <inkml:trace contextRef="#ctx0" brushRef="#br7" timeOffset="15343.849">1669 4645,'73'0,"144"-72,37-74,73 1,-1-72,-72 72,0-37,-72 110,-110-1,73 37,-72 36,-73-36,36 36,0 0,1 0,-1 0,0 0,-36 0</inkml:trace>
-  <inkml:trace contextRef="#ctx0" brushRef="#br8" timeOffset="17319.8529">4064 3121,'0'37,"0"-1,0 0,0 0,0 1,0-1,0 37,0-37,0 0,0 0,0 1,0-1,0 0,0 0,0 1,0-1,0 37,0-37,0 0,0 0,0 1,37-1,-1-36,-36 36,36-36,0 37,1-37,-1 0,0 0,1 0,-1 36,0-36,37 0,-1 0,-35 0,-1 0,0 0,0 0,-36-36,0-110,0 74,0-37,0 36,0 1,0-1,0 37,0 0,0 0,-36-1,36 1,-36 36,0-36,36-37,-37 1,-35 35,35-35,1-73,0 145,0-73,36 37,-37 0,1 36,0 0,36 36,0 0,0 0,0 37,-37-37,37 37,-36-1,36-35,0-37</inkml:trace>
-  <inkml:trace contextRef="#ctx0" brushRef="#br9" timeOffset="20543.8142">5117 2867,'0'36,"36"1,0 35,0 37,37-72,-37-1,1 36,-1 1,0-37,0 1,-36-1,37 0,-1 0,0 37,-36-37,36 1,-36-1,37 37,-1-37,0 0,-36 0,37-36,-37 37,-37-37,1-73,0 37,-1 36,37-36,0-1,-36 1,0 0,0-37,-1 37,1-1,0 1,36 0,0 0,-36-37,36 37,-37 36,37-37,-36 1,36 0,0 0,-36 36,36-37,0 1,0 0,0-1,0 1,36 0,0-37,37 1,-1 35,1-35,-37 35,37 1,-37-36,0 35,37 37,-37-36,-36 0,36 36,1-37,-1 37,0 0,1 0,-1 0,0 0,0 0,1 0,-1 0,0 0,1 37,-37-1,36 0,-36 1,36 35,-36-36,0 1,0-1,0 37,0-37,0 0,0 37,0-1,-36 1,0-37,36 1,-37-37,37 36,-36 0,0 0,-37-36,1 37,-1-1,0 37,1-37,36 0,-37 0,37-36,-1 0,1 37,72-1,37-36,-37 36,1-36,35 37,-36-37,1 0,35 0,-35 0,-1 36,0-36,0 0,1 0,35 0,-35 0,-1 0,0 0,0 0,1 0,35 0,-36 0,1 36,35-36,1 0,-37 0,37 37,-37-37,0 0,1 0,-1 0,-36 0</inkml:trace>
-  <inkml:trace contextRef="#ctx0" brushRef="#br10" timeOffset="21847.7137">5697 3810,'0'36,"0"1,37-1,-1-36,0 72,-36 1,37-73,-37 36,0 0,0-36</inkml:trace>
-  <inkml:trace contextRef="#ctx0" brushRef="#br11" timeOffset="26191.6695">1778 0,'0'36,"0"1,36-37,-36 36,0 0,37 1,-1-37,-36 36,0 0,0 1,0-1,0 0,0 0,0 1,0-1,0 0,0 1,0-1,0 0,0 0,0 1,0-1,0 0,0 1,0-1,0 0,0 0,0 1,0-1,0 0,0 1,0-1,0 0,0 0,0 1,0-1,0 0,0 1,0-1,0 0,0 1,0-1,0 0,0 0,0 1,0 35,0-35,0-1,0 0,0 0,0 37,0-37,0 1,0-1,0 36,0 1,0-37,0 37,0-1,0 37,0-36,0-1,0-35,0-1,0 0,0 1,0 35,-36-72,36 37,0-37</inkml:trace>
-  <inkml:trace contextRef="#ctx0" brushRef="#br12" timeOffset="28927.1677">4754 2322,'0'37,"0"-1,0 0,0 1,0-1,0 0,0 0,0 1,0-1,-37 37,1-1,36 1,-36-37,36 0,0 1,0-1,-36 0,36 37,-37-37,37 37,-36-37,36 0,0 0,0 1,0 108,-36-73,-37 37,37 0,36-36,-36-1,0 1,36-37,-37 37,37-37,0 0,-36 37,0 36,36-37,-37-35,37-1,0-36</inkml:trace>
-  <inkml:trace contextRef="#ctx0" brushRef="#br13" timeOffset="31343.3968">1669 5624,'36'0,"1"37,-1-37,-36 36,0 0,36-36,-36 37,0-1,0 0,37 0,-37 37,36-37,0 37,-36-37,36 0,-36 1,37-37,-37 36,0 0,36 1,-36-1,0 0,36 0,-36 1,0-1,37 0,-1-36,-36 37,0-1,36 0,-36 0,0 1,36-37,-36 36,37 0,-37 1,0-1,0 0,36 0,0 37,-36 0,37-37,-37 0,36-36,-36 36,0 1,36-37,-36 36,0 0,36-36,-36 37,37-37,-37 36,0 0,0 0,36 1,-36-1,0 0,36-36,-36 37,0-37</inkml:trace>
-  <inkml:trace contextRef="#ctx0" brushRef="#br14" timeOffset="33056.3605">2685 5515,'0'37,"36"-1,-36 0,37 0,-37 1,36-1,0 37,-36-37,37-36,-37 36,0 0,36-36,-36 37,0-1,36 0,-36 1,0-1,36-36,-36 36,37-36,-37 73,36-37,-36 0,36 1,1-37,-37 36,36-36,0 36,-36 0,37-36,-37 37,0-1,0 0,36 1,0-37,-36 36,0 0,0 0,36 1,-36-1,37 0,-37 1,36-37,-36 36,0 0,0 0,0 1,36-1,1 0,-37 1,36-37,-36 36,36-36,1 72,-1-35,-36 35,36-72,-36 37,0-1,36 0,-36 0,0-36</inkml:trace>
-  <inkml:trace contextRef="#ctx0" brushRef="#br15" timeOffset="34383.7646">2177 6858,'0'-37,"0"1,36 36,1-36,35-1,1 1,-73 0,109 0,36-1,-36-35,-37-1,1 1,-1 36,-35-1,-1 1,0 36,1 0,-37 0</inkml:trace>
-  <inkml:trace contextRef="#ctx0" brushRef="#br16" timeOffset="38687.1329">3882 5152,'0'37,"-36"-37,36 36,-36-36,36 36,-36-36,36 37,-37-1,1 0,36 1,0 35,0-36,0 1,0-1,0 0,0 1,0-1,0 0,0 0,0 1,0-1,0 0,0 1,0-1,0 0,0 0,36-36,-36 37,37-1,-37 0,0 1,36-37,-36 36,36 0,-36 1,0-1,36-36,-36 36,37 0,-37 1,36-37,-36 36,0 0,36-36,1 0,-37 37,36-1,0 0,0-36,-36 36,37-36,-1 37,0-37,0 36,1-36,-1 36,0-36,1 37,-1-37,0 0,0 0,1 0,-1 0,0 0,-36-37,0 1,37 36,-37-36,0-1,0 1,0 0,36 36,-36-36,36-37,-36 0,36-72,1 145,-37-36,0 0,0-1,0 1,0 0,0-1,-37 1,37-36,-36-1,36 0,0 1,0 36,0-1,0 1,-36 36,0-36,-1-1,1 1,0 0,-1 36,37-36,-36 36,36-37,-36 37,0-36,-1 0,1 36,0-37,36 1,-37 36,37-36,-36 36,0 0,0 0,-1-37,1 1,0 36,36-36,-36 36,-1 0,1-36,0 36,36-37,-37 37,37-36,-36 36,0 0,36 0</inkml:trace>
-  <inkml:trace contextRef="#ctx0" brushRef="#br17" timeOffset="42752.039">5371 4608,'0'37,"0"-1,0 37,-37-37,37 0,0 1,0-1,0 0,0 0,0 1,0-1,0 0,0 1,0-1,0 0,0 0,0 1,0-1,37 37,-37-37,0 0,0 1,36-37,-36 36,0 0,0 0,0 1,36-37,-36 36,0 0,36-36,-36 37,37-1,-37 0,0 0,36 1,0-37,-36 36,0 0,36-36,1 37,-37-1,36-36,-36 36,36-36,1 36,-1 1,-36-1,36-36,-36 36,36-36,-36 37,37-37,-37 36,36-36,-36 36,36-36,1 0,-37 37,36-37,0 0,0 0,1 0,-1 0,0 0,0 0,1-37,-37 1,36-37,-36 1,36-1,1 37,-37 0,0-1,0 1,36 0,-36-1,0 1,0 0,0 0,0-1,0 1,0-37,0 37,0 0,0 0,-36-1,36 1,0 0,-37-1,1 1,36 0,0-1,-36 1,-1-36,1 35,36 1,-36 36,0 0,36-36,-37-1,37 1,0 0,-36 36,0-73,0 37,-1 36,1-36,0-1,-1 1,37 0,0-1,-36 37,0 0,0 0,-1 0,1 0,36-36,-36 36,-1 0,1 0,0 0,0 0,-1 0,1 0,36 0</inkml:trace>
-  <inkml:trace contextRef="#ctx0" brushRef="#br18" timeOffset="49863.5264">6858 4354,'0'36,"37"1,-37-1,0 0,0 1,36-37,-36 36,36 0,-36 0,0 1,36-1,1 36,-37-35,36-1,-36 0,36 1,-36-1,0 0,0 0,37-36,-37 37,0-1,36-36,-36 36,36-36,0 73,1-1,-1-35,0-1,1 0,-37 0,0 1,36-37,-36 36,36 0,0-36,-36 37,0-1,0 0,0 0,37-36,-37 37,36-1,-36 0,36-36,-36 37,37-37,-1-37,0 37,-36-36,36 0,1 36,35-73,-72 37,37 0,35-1,-72 1,36 36,1-36,-1-1,0-35,1 72,-37-73,36 37,-36 0,0 0,0-1,0 1,0 0,0-1,36 1,-36 0,0 0,-36-1,36 1,0 0,0-1,-36 1,36 0,-37 36,37-36,-36 36,36-37,-36 1,-1 0,1 0,36-1,-36 37,0-36,-1 36,37-36,-36 36,0-37,36 1,-37 36,1 0,0-36,0 36,-1 0,1 0,0 0,-1 0,1 0,0-36,0 36,-1 0,1 0,0 0,-1 0,1 0,0 0,0 0,-1 0,1 0,0 0,-1 0,74 0,-1-37,37 37,-37-36,0 36,0 0,1 0,-1 0,0 0,37 0,-37 0,0 0,37 0,-37 0,1 0,-1 0,0 0,0 0,1 0,-1 0,0 36,1-36,-37 37,36-37,0 36,0 0,1 0,-37 1,36-37,-36 36,36-36,1 0,-37 36,0 1,36-37,-36 36,0 0,0 0,36 1,-36-1,0 0,0 0,0 1,0-1,0 0,36-36,-36 37,0-1,0 73,0-73,0 37,-36-1,0 1,36-37,-36 36,-1-35,37 35,-36-35,36-1,0 0,-36-36,-1 36,1-36,36 37,-36-37,0 0,36 36,-37-36,1 0,0 0,-1 0,1 0,0 0,36 36,-36-36,-1 0,1 0,0 0,-1 37,37-37</inkml:trace>
-  <inkml:trace contextRef="#ctx0" brushRef="#br19" timeOffset="53063.5472">4173 4499,'0'73,"0"-37,0 73,0-36,0-1,0 1,0-37,0 0,0 1,0-1,0 0,0 0,0 1,0 35,0-35,0-1,0 0,0 37,0-37,37 37,-37-37,0 0,0 37,0-37,0 0,0 1,0-1,0 0,0 0,36 1,-36-1,0 0,0 1,0-1,0 0,0 0,0 1,0-1,36 0,-36 1,0-1,36 0,-36 0,0 1,0-1,0 0,0 1,37-37,-37 36,0 0,0 0,0 1,36-37,-36 36,0 0,36-36,-36 37,0-1,36 0,-36 0,0 1,0-1,37-36,-37 73,0-37,0 0,0 0,0-36</inkml:trace>
-  <inkml:trace contextRef="#ctx0" brushRef="#br20" timeOffset="57495.6161">5879 4318,'0'36,"36"-36,-36 37,36-1,0-36,-36 36,0 1,0-1,0 0,37-36,-37 37,0-1,0 0,0 0,0 1,36-37,-36 36,0 0,0 1,0-1,0 0,0 0,0 1,0-1,0 0,0 1,0-1,0 0,0 0,0 1,0-1,0 0,0 1,0-1,0 0,0 1,0-1,0 0,0 37,0-37,0 0,0 1,0-1,0 0,0 0,0 1,0 35,0-35,0-1,0 0,0 0,0 1,36-1,-36 0,0 1,0-1,36-36,-36 36,0 0,0 1,37-1,-37 0,0 1,36-1,-36 0,0 1,0-37</inkml:trace>
-  <inkml:trace contextRef="#ctx0" brushRef="#br21" timeOffset="63247.2668">7511 5806,'0'-36,"36"-1,-36 1,0 0,37 36,-1-37,37-35,-1-1,1 1,-37 35,1 1,-37 0,36 36,-36-36,0-1,0 1,36 0,-36-1,36 1,-36-37,0 37,0 0,0 0,0-1,0 1,0 0,0-37,0 37,0 0,0-1,0 1,0 0,0-1,0 1,0 0,0-1,0 1,-36 0,36 0,-36 36,36-37,0 1,-36 0,36-1,-37 37,37-36,-36 0,36 0,0 36</inkml:trace>
+  <inkml:trace contextRef="#ctx0" brushRef="#br0">671 800,'0'-36,"-41"36,-2 0,1 0,1 0,-2 0,1 0,1 0,-1 0,42 36,-42-36,42 37,-42-1,0 0,42 1,-42-1,42 0,-42-36,42 37,0-1,-42-36,42 36,0 0,0 1,0-1,-41-36,41 36,0 1,0-1,0 0,-43 1,43 0,0 35,0-35,0 35,0-35,0-1,0 0,0 0,0 1,0-1,0 0,0 1,0-1,0 0,43-36,-43 36,0 1,0-1,0 0,41-36,-41 37,42-1,-42 0,42 0,0-36,0 37,0-37,-42 37,42-37,0 36,-1 1,1-37,-42 36,43-36,-43 36,41-36,-41 37,42-37,1 0,-2 0,-41 36,42-36,0 0,0 0,0 0,0-36,42-1,-43 37,1-36,-42 0,43-1,-2 1,1 36,1 0,-43-37,0 0,41-35,-41 36,42-37,0 0,-42 37,42-36,0-1,0 73,-42-36,0-1,42 37,-42 37,42-1,-42 0,0 1,42-37,-42 36,41 0,-41 0,43-36,-43 37,41-1,-41 0,0 1,0-1,42-36,-42 36,43-36,-43 36,41-36,-41 37,0 0,42-37,-42 36,42-36,0 37,0-37,0 0,0 0,0 0,0 0,-1 0,2 0,-2 0,44 0,-2-73,1 36,-42-36,42 37,-42 36,-42-36,42 36,-42-37,0 1,0-37,41 37,-41 0,0 0,0-1,0 1,0-37,0 1,0-37,0 0,-41-37,41 37,-42 0,0 37,42-1,-42 37,42-1,0 1,-42 36,0 0,0 0,0 0,42-36,-42 36,1 0,-2 0,1 0,1 0,-2 0,2 0,-1 0,0 0,0 0,0 0,0 0,0 0,42 36,0 0,-42 1,0-1,42 0,-41-36,-2 37,1-1,1 0,41 0,0 1,-43-37,43 36,-41 37,41-37,-42 0,42 1,-42 0,0-1,0 0,42 1,0-1,0 0,0 1,0-1,0-36</inkml:trace>
+  <inkml:trace contextRef="#ctx0" brushRef="#br1" timeOffset="3703.9181">3187 619,'42'0,"-42"36,41 37,2-1,-1 1,-1-1,1-36,-42 1,0 35,0-35,43-37,-43 36,0 0,0 0,0 37,0 0,0 0,41-73,-41 73,0-37,0 0,0 1,0-1,0 0,42-36,-42 36,0 1,42-37,-42 36,0 0,0 0,0 1,42-37,-42 36,0 0,0 1,42-1,-42 0,0 0,0 1,0-1,41-36,2 0,-1 0,-42 36,41-36,2 37,-1-37,-42 36,41-36,1 0,1 0,-2 0,1 0,0 0,0 0,0 0,-42-36,41-1,2 37,-1-36,-1 0,-41-1,43 37,-1-36,41-109,-40 72,-2 1,-41 36,42-1,1 37,-43-36,0 0,0-37,0 1,0 35,0 1,0 0,-43-1,43-36,-83 0,83 37,-43-36,-40-1,-2 37,2-37,83 37,-43 0,2-1,-1 37,0-36,0 0,0 0,1-1,-2 1,1 0,1 36,-1 0,42-37,-43 37,2 0,41-36,-42 36,-1 0,2 0,-1 0,0 0,0 0,0 0,1-36,-2 36,1 0,1 0,-1 0,-1 0,2-36,-1 36,-1 0,2 0,41 0</inkml:trace>
+  <inkml:trace contextRef="#ctx0" brushRef="#br2" timeOffset="6215.8407">4696 219,'43'36,"-1"0,-1 37,-41-37,42 0,0 2,0 34,0-36,-42 1,42-1,-42 0,42 1,-42-1,42 0,-42 0,0 1,41-1,2-36,-43 36,0 1,42-37,-42 36,0 0,41 0,-41 1,42-37,-42 36,0 0,43 1,-43-1,0 0,0 0,0 1,41 0,-41-1,42 1,-42-1,42-36,-42 36,42 0,-42 1,42-37,-42 36,0 0,0 1,41-37,2 36,-1 0,-1 0,-41 1,43-1,-1 0,-1 1,1-1,1-36,-2 36,1-36,0 36,0-36,41 37,-40-37,-1 0,-1 0,2 0,-1 0,-1 0,1 0,1 0,40 0,-42-37,2 37,-43-36,42 36,-1-36,2 36,-1 0,41 0,43-73,-83 73,-2 0,1 0,-1 0,2 0,-1 0,-1 0,2 0,-43 0</inkml:trace>
+  <inkml:trace contextRef="#ctx0" brushRef="#br3" timeOffset="8216.067">4696 218,'0'-36,"43"36,-1-36,-1-1,1 37,0 0,0 0,0 0,0 0,0 0,0 0,0 0,0 0,0 0,-1 0,2 0,-1 0,-1 0,43 0,-42 0,0 0,42 0,-42 0,0 0,42 0,-42 0,0 0,0 0,-1 0,2 0,40 0,-40 0,40 0,-41 0,0 0,0 0,0 0,-42 0</inkml:trace>
+  <inkml:trace contextRef="#ctx0" brushRef="#br4" timeOffset="9367.2734">5326 1454,'0'-38,"42"2,83 0,-41-37,42 1,0 35,-43 1,1 36,0-36,-42 36,0-37,-1 37,2 0,-1 0,41 0,-40 0,-2 0,1 0,1 0,-2-36,-41 36</inkml:trace>
+  <inkml:trace contextRef="#ctx0" brushRef="#br5" timeOffset="11815.1725">2264 3343,'42'0,"0"0,0 37,-42-1,41 0,-41 1,43-37,-1 72,-1-35,-41-1,43 0,-1 0,-42 1,0-1,0 0,41-36,-41 37,0-1,42 0,-42 0,43-36,-43 37,41-1,-41 0,0 1,42-37,-42 36,0 0,41-36,-41 37,43 36,-43-37,0 1,0-1,42 0,-1 1,2 35,-43-36,0 1,42 35,-1-35,1-1,-42 0,0 1,43-37,-43 0</inkml:trace>
+  <inkml:trace contextRef="#ctx0" brushRef="#br6" timeOffset="13544.0298">1510 3743,'0'-37,"0"1,42 0,0 36,-1 0,2 0,-2 0,1 0,1 0,40 0,1 0,0 0,0 0,42 0,-43 0,1 0,1 0,-2 0,-83-37,42 37,-42-36,42 36,84-73,-43 37,-41-36,42 35,-42 1,42-1,-42 37,42-37,-42 1,0 36,42 0,-42 0,0 0,0 0,-1 0,1 0,1 0,-2 0,1 0,1 36,-2 1,-41 0,42-37,-42 0</inkml:trace>
+  <inkml:trace contextRef="#ctx0" brushRef="#br7" timeOffset="15343.849">1929 4650,'84'0,"167"-72,42-74,85 1,-1-73,-84 73,1-37,-84 110,-127-1,85 37,-84 36,-84-36,42 36,-1 0,2 0,-1 0,-1 0,-41 0</inkml:trace>
+  <inkml:trace contextRef="#ctx0" brushRef="#br8" timeOffset="17319.8528">4696 3124,'0'37,"0"-1,0 0,0 0,0 2,0-2,0 37,0-37,0 0,0 0,0 1,0-1,0 0,0 0,0 1,0-1,0 37,0-37,0 0,0 0,0 1,43-1,-1-36,-42 36,41-36,1 37,0-37,0 0,0 0,0 0,0 36,0-36,42 0,-1 0,-40 0,-1 0,-1 0,1 0,-42-36,0-110,0 74,0-37,0 36,0 1,0-1,0 37,0 0,0 0,-42-1,42 1,-41 36,-1-36,42-38,-43 2,-40 35,40-35,2-73,-1 145,0-73,42 37,-42 0,0 36,0 0,42 36,0 0,0 0,0 37,-42-37,42 37,-42-1,42-35,0-37</inkml:trace>
+  <inkml:trace contextRef="#ctx0" brushRef="#br9" timeOffset="20543.8141">5913 2870,'0'36,"42"1,-1 35,1 37,42-72,-42-1,0 36,0 2,0-38,-1 1,-41-1,43 0,-1 0,-1 37,-41-37,42 1,-42-1,43 37,-2-37,1 0,-42 0,43-36,-43 37,-43-37,1-73,1 37,-2 36,43-36,0-1,-42 1,1 0,-1-37,-1 37,2-1,-1 1,42 0,0 0,-42-37,42 37,-42 36,42-38,-42 2,42 0,0 0,-42 36,42-37,0 1,0 0,0-1,0 1,42 0,0-37,42 1,-1 35,2-35,-44 35,44 1,-44-36,1 35,42 37,-42-36,-42 0,41 36,2-37,-1 37,-1 0,2 0,-1 0,-1 0,1 0,1 0,-2 0,1 0,1 37,-43-1,41 0,-41 1,42 35,-42-36,0 1,0-1,0 37,0-37,0 0,0 37,0-1,-42 1,1-37,41 1,-43-37,43 36,-42 0,1 0,-44-36,2 38,-1-2,-1 37,2-37,42 0,-44 0,44-36,-2 0,1 37,84-1,42-36,-42 36,1-36,40 37,-42-37,2 0,40 0,-40 0,-1 36,-1-36,1 0,1 0,40 0,-40 0,-2 0,1 0,-1 0,2 0,40 0,-41 0,1 36,40-36,1 0,-42 0,42 37,-42-37,-1 0,2 0,-1 0,-42 0</inkml:trace>
+  <inkml:trace contextRef="#ctx0" brushRef="#br10" timeOffset="21847.7137">6583 3814,'0'36,"0"1,43-1,-1-36,-1 72,-41 1,43-73,-43 36,0 0,0-36</inkml:trace>
+  <inkml:trace contextRef="#ctx0" brushRef="#br11" timeOffset="26191.6694">2055 0,'0'36,"0"1,41-37,-41 36,0 0,43 1,-1-37,-42 36,0 0,0 1,0-1,0 0,0 0,0 1,0 0,0-1,0 1,0-1,0 0,0 0,0 1,0-1,0 0,0 1,0-1,0 0,0 0,0 1,0-1,0 0,0 1,0-1,0 0,0 0,0 1,0-1,0 0,0 1,0-1,0 0,0 2,0-2,0 0,0 0,0 1,0 35,0-35,0-1,0 0,0 0,0 37,0-37,0 1,0-1,0 36,0 1,0-37,0 37,0-1,0 38,0-37,0-1,0-35,0-1,0 0,0 1,0 35,-42-72,42 37,0-37</inkml:trace>
+  <inkml:trace contextRef="#ctx0" brushRef="#br12" timeOffset="28927.1677">5493 2324,'0'38,"0"-2,0 0,0 1,0-1,0 0,0 0,0 1,0-1,-42 37,0-1,42 1,-41-37,41 0,0 1,0-1,-42 0,42 37,-43-37,43 37,-41-37,41 0,0 1,0 0,0 108,-42-73,-42 37,42 0,42-36,-42-1,1 1,41-37,-43 37,43-37,0 0,-42 38,1 35,41-37,-43-35,43-1,0-36</inkml:trace>
+  <inkml:trace contextRef="#ctx0" brushRef="#br13" timeOffset="31343.3968">1929 5630,'41'0,"2"37,-1-37,-42 36,0 0,41-36,-41 37,0-1,0 0,43 0,-43 37,42-37,-1 37,-41-37,42 0,-42 2,42-38,-42 36,0 0,42 1,-42-1,0 0,42 0,-42 1,0-1,42 0,0-36,-42 37,0-1,42 0,-42 0,0 1,41-37,-41 36,43 0,-43 1,0-1,0 0,42 0,-1 37,-41 0,43-37,-43 1,42-37,-42 36,0 1,41-37,-41 36,0 0,42-36,-42 37,42-37,-42 36,0 0,0 0,42 1,-42-1,0 0,42-36,-42 37,0-37</inkml:trace>
+  <inkml:trace contextRef="#ctx0" brushRef="#br14" timeOffset="33056.3605">3103 5521,'0'37,"41"-1,-41 0,43 0,-43 1,42-1,-1 37,-41-37,43-36,-43 36,0 0,42-36,-42 37,0-1,41 0,-41 1,0-1,42-36,-42 36,43-36,-43 74,41-38,-41 0,42 1,0-37,-42 36,42-36,0 36,-42 0,42-36,-42 37,0-1,0 0,42 1,0-37,-42 36,0 0,0 0,41 1,-41-1,43 0,-43 1,42-37,-42 36,0 0,0 0,0 1,41-1,2 0,-43 1,42-37,-42 37,41-37,2 72,-2-35,-41 35,42-72,-42 37,0-1,42 0,-42 0,0-36</inkml:trace>
+  <inkml:trace contextRef="#ctx0" brushRef="#br15" timeOffset="34383.7645">2516 6865,'0'-37,"0"1,41 36,2-36,40-1,2 1,-85 0,125 0,43-1,-42-35,-43-1,2 1,-2 36,-40-1,-2 1,1 36,0 0,-42 0</inkml:trace>
+  <inkml:trace contextRef="#ctx0" brushRef="#br16" timeOffset="38687.1328">4486 5157,'0'37,"-42"-37,42 37,-41-37,41 36,-42-36,42 37,-43-1,2 0,41 1,0 35,0-36,0 1,0-1,0 0,0 1,0-1,0 0,0 0,0 1,0-1,0 0,0 1,0-1,0 0,0 0,41-36,-41 37,43-1,-43 0,0 2,42-38,-42 36,41 0,-41 1,0-1,42-36,-42 36,43 0,-43 1,41-37,-41 36,0 0,42-36,1 0,-43 37,41-1,1 0,-1-36,-41 36,43-36,-1 37,-1-37,1 36,1-36,-2 36,1-36,1 37,-2-37,1 0,-1 0,2 0,-1 0,-1 0,-41-37,0 1,43 36,-43-36,0-1,0 1,0 0,42 36,-42-36,41-37,-41 0,42-72,1 145,-43-36,0 0,0-2,0 2,0 0,0-1,-43 1,43-36,-42-1,42 0,0 1,0 36,0-1,0 1,-41 36,-1-36,-1-1,2 1,-1 0,-1 36,43-36,-41 36,41-37,-42 37,1-36,-2 0,1 36,1-37,41 1,-43 36,43-37,-42 37,1 0,-1 0,-1-37,2 1,-1 36,42-36,-41 36,-2 0,1-36,1 36,41-37,-43 37,43-36,-42 36,1 0,41 0</inkml:trace>
+  <inkml:trace contextRef="#ctx0" brushRef="#br17" timeOffset="42752.039">6206 4613,'0'37,"0"-1,0 37,-42-37,42 0,0 1,0-1,0 0,0 0,0 1,0-1,0 0,0 1,0-1,0 0,0 1,0 0,0-1,42 37,-42-37,0 0,0 1,42-37,-42 36,0 0,0 0,0 1,42-37,-42 36,0 0,41-36,-41 37,43-1,-43 0,0 0,42 1,-1-37,-41 36,0 0,42-36,1 37,-43-1,41-36,-41 36,42-36,1 36,-2 1,-41 0,42-37,-42 36,41-36,-41 37,43-37,-43 36,42-36,-42 36,41-36,2 0,-43 37,42-37,-1 0,1 0,1 0,-2 0,1 0,-1 0,2-37,-43 1,42-37,-42 0,41 0,2 37,-43 0,0-1,0 1,42 0,-42-1,0 1,0 0,0 0,0-1,0 1,0-37,0 37,0 0,0 0,-42-1,42 1,0 0,-43-1,2 1,41 0,0-1,-42 0,-1-35,2 35,41 1,-42 36,1 0,41-36,-43-1,43 1,0 0,-42 36,1-73,-1 37,-1 36,2-36,-1-1,-1 1,43 0,0-1,-41 37,-1 0,1 0,-2 0,1 0,42-36,-41 36,-2 0,1 0,1 0,-1 0,-1 0,2 0,41 0</inkml:trace>
+  <inkml:trace contextRef="#ctx0" brushRef="#br18" timeOffset="49863.5263">7925 4359,'0'36,"43"1,-43-1,0 0,0 1,41-37,-41 36,42 0,-42 0,0 1,41-1,2 36,-43-35,42-1,-42 0,41 1,-41-1,0 0,0 0,43-36,-43 37,0-1,42-36,-42 36,41-36,1 74,1-2,-2-35,1-1,1 0,-43 0,0 1,41-37,-41 36,42 0,-1-36,-41 37,0-1,0 0,0 0,43-36,-43 37,42-1,-42 0,41-36,-41 37,43-37,-1-37,-1 37,-41-36,42 0,1 36,40-73,-83 37,43 0,40-1,-83 1,41 36,2-36,-1-1,-1-35,2 72,-43-73,42 37,-42 0,0-1,0 0,0 1,0 0,0-1,41 1,-41 0,0 0,-41-1,41 1,0 0,0-1,-42 1,42 0,-43 36,43-36,-41 36,41-37,-42 1,-1 0,2 0,41-1,-42 37,1-36,-2 36,43-36,-42 36,1-37,41 1,-43 36,1 0,1-36,-1 36,-1 0,2 0,-1 0,-1 0,2 0,-1-36,1 36,-2 0,1 0,1 0,-2 0,1 0,1 0,-1 0,-1 0,2 0,-1 0,-1 0,86 0,-1-38,42 38,-42-36,-1 36,1 0,1 0,-2 0,1 0,42 0,-42 0,-1 0,44 0,-44 0,2 0,-1 0,-1 0,1 0,1 0,-2 0,1 36,1-36,-43 38,41-38,1 36,-1 0,2 0,-43 1,42-37,-42 36,41-36,2 0,-43 36,0 1,42-37,-42 36,0 0,0 0,41 1,-41-1,0 0,0 0,0 1,0-1,0 0,42-36,-42 37,0-1,0 73,0-73,0 37,-42 0,1 0,41-37,-42 36,-1-35,43 35,-41-35,41-1,0 0,-42-36,-1 36,2-36,41 37,-42-37,1 0,41 36,-43-36,1 0,1 0,-2 0,1 0,1 0,41 36,-42-36,-1 0,2 0,-1 0,-1 37,43-37</inkml:trace>
+  <inkml:trace contextRef="#ctx0" brushRef="#br19" timeOffset="53063.5472">4822 4504,'0'73,"0"-37,0 73,0-36,0-1,0 1,0-37,0 0,0 1,0-1,0 0,0 0,0 1,0 36,0-36,0-1,0 0,0 37,0-37,43 37,-43-37,0 0,0 37,0-37,0 0,0 1,0-1,0 0,0 0,41 1,-41-1,0 0,0 1,0-1,0 0,0 1,0 0,0-1,42 0,-42 1,0-1,42 0,-42 0,0 1,0-1,0 0,0 1,42-37,-42 36,0 0,0 0,0 1,42-37,-42 36,0 0,42-36,-42 37,0-1,41 0,-41 0,0 1,0-1,43-36,-43 73,0-36,0-1,0 0,0-36</inkml:trace>
+  <inkml:trace contextRef="#ctx0" brushRef="#br20" timeOffset="57495.6161">6793 4323,'0'36,"42"-36,-42 37,42-1,-1-36,-41 36,0 1,0-1,0 0,43-36,-43 37,0-1,0 0,0 0,0 1,42-37,-42 36,0 0,0 1,0-1,0 0,0 0,0 1,0-1,0 0,0 1,0-1,0 0,0 1,0 0,0-1,0 0,0 1,0-1,0 0,0 1,0-1,0 0,0 37,0-37,0 0,0 1,0-1,0 0,0 0,0 1,0 35,0-35,0-1,0 0,0 0,0 1,41 0,-41-1,0 1,0-1,42-36,-42 36,0 0,0 1,43-1,-43 0,0 1,41-1,-41 0,0 1,0-37</inkml:trace>
+  <inkml:trace contextRef="#ctx0" brushRef="#br21" timeOffset="63247.2668">8679 5812,'0'-36,"42"-1,-42 1,0 0,43 36,-2-37,44-35,-2-1,1 1,-42 35,1 1,-43 0,41 36,-41-36,0-1,0 0,42 1,-42-1,41 1,-41-37,0 37,0 0,0 0,0-1,0 1,0 0,0-37,0 37,0 0,0-1,0 1,0 0,0-1,0 1,0 0,0-1,0 1,-41 0,41 0,-42 36,42-38,0 2,-41 0,41-1,-43 37,43-36,-42 0,42 0,0 36</inkml:trace>
 </inkml:ink>
 </file>
 
@@ -20169,14 +20174,14 @@
           <a:lstStyle/>
           <a:p>
             <a:r>
-              <a:rPr lang="en-GB"/>
+              <a:rPr lang="en-GB" dirty="0"/>
               <a:t> </a:t>
             </a:r>
             <a:r>
-              <a:rPr lang="en-GB" b="1">
+              <a:rPr lang="en-GB" b="1" dirty="0">
                 <a:latin typeface="Arial Narrow" panose="020B0606020202030204" pitchFamily="34" charset="0"/>
               </a:rPr>
-              <a:t>Its time you ? Equality </a:t>
+              <a:t>It’s time you ? Equality </a:t>
             </a:r>
           </a:p>
         </p:txBody>
@@ -20307,12 +20312,12 @@
         <p:spPr>
           <a:xfrm>
             <a:off x="6400800" y="2251587"/>
-            <a:ext cx="5147730" cy="3637935"/>
+            <a:ext cx="4302579" cy="3637935"/>
           </a:xfrm>
         </p:spPr>
         <p:txBody>
           <a:bodyPr>
-            <a:normAutofit/>
+            <a:normAutofit fontScale="92500"/>
           </a:bodyPr>
           <a:lstStyle/>
           <a:p>
@@ -20321,8 +20326,8 @@
               <a:buChar char="v"/>
             </a:pPr>
             <a:r>
-              <a:rPr lang="en-GB"/>
-              <a:t> Gender equality levels vary in different countries. Comparing the data sets extracted from various countries would not be enough to raise the awareness of people</a:t>
+              <a:rPr lang="en-GB" dirty="0"/>
+              <a:t> Gender equality levels vary in different countries.       Comparing the data sets extracted from various countries would not be enough to raise the awareness of people</a:t>
             </a:r>
           </a:p>
           <a:p>
@@ -20331,7 +20336,7 @@
               <a:buChar char="v"/>
             </a:pPr>
             <a:r>
-              <a:rPr lang="en-GB"/>
+              <a:rPr lang="en-GB" dirty="0"/>
               <a:t>The project is looking at the issues in different angle, representing the data in more attractive way</a:t>
             </a:r>
           </a:p>
@@ -20341,7 +20346,7 @@
               <a:buChar char="v"/>
             </a:pPr>
             <a:r>
-              <a:rPr lang="en-GB"/>
+              <a:rPr lang="en-GB" dirty="0"/>
               <a:t>The project is divided into two main components:</a:t>
             </a:r>
           </a:p>
@@ -20350,7 +20355,7 @@
               <a:buNone/>
             </a:pPr>
             <a:r>
-              <a:rPr lang="en-GB"/>
+              <a:rPr lang="en-GB" dirty="0"/>
               <a:t>1.Quiz</a:t>
             </a:r>
           </a:p>
@@ -20359,7 +20364,7 @@
               <a:buNone/>
             </a:pPr>
             <a:r>
-              <a:rPr lang="en-GB"/>
+              <a:rPr lang="en-GB" dirty="0"/>
               <a:t>2.Game  </a:t>
             </a:r>
           </a:p>
@@ -20628,7 +20633,7 @@
             <a:pPr algn="ctr"/>
             <a:r>
               <a:rPr lang="en-GB" b="1" dirty="0"/>
-              <a:t>Contribute to better community</a:t>
+              <a:t>Contribute to better community and pass it to the next generation</a:t>
             </a:r>
           </a:p>
         </p:txBody>
@@ -21034,7 +21039,7 @@
             <p:ph idx="1"/>
             <p:extLst>
               <p:ext uri="{D42A27DB-BD31-4B8C-83A1-F6EECF244321}">
-                <p14:modId xmlns:p14="http://schemas.microsoft.com/office/powerpoint/2010/main" val="683847559"/>
+                <p14:modId xmlns:p14="http://schemas.microsoft.com/office/powerpoint/2010/main" val="3811489668"/>
               </p:ext>
             </p:extLst>
           </p:nvPr>
@@ -21429,7 +21434,7 @@
           <a:lstStyle/>
           <a:p>
             <a:r>
-              <a:rPr lang="en-GB">
+              <a:rPr lang="en-GB" b="1" dirty="0">
                 <a:solidFill>
                   <a:srgbClr val="FFFFFF"/>
                 </a:solidFill>
@@ -21449,7 +21454,7 @@
             <p:ph idx="1"/>
             <p:extLst>
               <p:ext uri="{D42A27DB-BD31-4B8C-83A1-F6EECF244321}">
-                <p14:modId xmlns:p14="http://schemas.microsoft.com/office/powerpoint/2010/main" val="2171647050"/>
+                <p14:modId xmlns:p14="http://schemas.microsoft.com/office/powerpoint/2010/main" val="3998881514"/>
               </p:ext>
             </p:extLst>
           </p:nvPr>
@@ -29845,7 +29850,7 @@
         </p:blipFill>
         <p:spPr>
           <a:xfrm>
-            <a:off x="-2382" y="-5645"/>
+            <a:off x="5782" y="10683"/>
             <a:ext cx="5308800" cy="5369215"/>
           </a:xfrm>
           <a:custGeom>
@@ -29928,38 +29933,6 @@
       </p:pic>
       <p:sp>
         <p:nvSpPr>
-          <p:cNvPr id="2" name="Title 1">
-            <a:extLst>
-              <a:ext uri="{FF2B5EF4-FFF2-40B4-BE49-F238E27FC236}">
-                <a16:creationId xmlns:a16="http://schemas.microsoft.com/office/drawing/2014/main" id="{DE045083-796D-490F-A48D-C3470DB04E6D}"/>
-              </a:ext>
-            </a:extLst>
-          </p:cNvPr>
-          <p:cNvSpPr>
-            <a:spLocks noGrp="1"/>
-          </p:cNvSpPr>
-          <p:nvPr>
-            <p:ph type="ctrTitle"/>
-          </p:nvPr>
-        </p:nvSpPr>
-        <p:spPr>
-          <a:xfrm>
-            <a:off x="5459709" y="4050264"/>
-            <a:ext cx="5700416" cy="1412858"/>
-          </a:xfrm>
-        </p:spPr>
-        <p:txBody>
-          <a:bodyPr>
-            <a:normAutofit/>
-          </a:bodyPr>
-          <a:lstStyle/>
-          <a:p>
-            <a:endParaRPr lang="en-GB" sz="4000" dirty="0"/>
-          </a:p>
-        </p:txBody>
-      </p:sp>
-      <p:sp>
-        <p:nvSpPr>
           <p:cNvPr id="3" name="Subtitle 2">
             <a:extLst>
               <a:ext uri="{FF2B5EF4-FFF2-40B4-BE49-F238E27FC236}">
@@ -29976,8 +29949,8 @@
         </p:nvSpPr>
         <p:spPr>
           <a:xfrm>
-            <a:off x="5459709" y="5466298"/>
-            <a:ext cx="5700416" cy="401101"/>
+            <a:off x="7583991" y="5466298"/>
+            <a:ext cx="4311373" cy="420855"/>
           </a:xfrm>
         </p:spPr>
         <p:txBody>
@@ -29986,7 +29959,10 @@
           </a:bodyPr>
           <a:lstStyle/>
           <a:p>
-            <a:endParaRPr lang="en-GB"/>
+            <a:r>
+              <a:rPr lang="en-GB" b="1" dirty="0"/>
+              <a:t>Wait for the last slide</a:t>
+            </a:r>
           </a:p>
         </p:txBody>
       </p:sp>
@@ -30184,8 +30160,8 @@
               <p14:nvPr/>
             </p14:nvContentPartPr>
             <p14:xfrm>
-              <a:off x="8085806" y="757577"/>
-              <a:ext cx="2978640" cy="2717400"/>
+              <a:off x="8085805" y="757576"/>
+              <a:ext cx="3442165" cy="2720409"/>
             </p14:xfrm>
           </p:contentPart>
         </mc:Choice>
@@ -30210,8 +30186,8 @@
             </p:blipFill>
             <p:spPr>
               <a:xfrm>
-                <a:off x="8073926" y="745696"/>
-                <a:ext cx="3002400" cy="2741161"/>
+                <a:off x="8073924" y="745696"/>
+                <a:ext cx="3465926" cy="2744168"/>
               </a:xfrm>
               <a:prstGeom prst="rect">
                 <a:avLst/>

</xml_diff>

<commit_message>
hello, early birdsPlease enter the commit message for your changes. Lines starting
</commit_message>
<xml_diff>
--- a/codeforhood.pptx
+++ b/codeforhood.pptx
@@ -10,8 +10,9 @@
     <p:sldId id="258" r:id="rId4"/>
     <p:sldId id="259" r:id="rId5"/>
     <p:sldId id="260" r:id="rId6"/>
-    <p:sldId id="261" r:id="rId7"/>
-    <p:sldId id="262" r:id="rId8"/>
+    <p:sldId id="263" r:id="rId7"/>
+    <p:sldId id="261" r:id="rId8"/>
+    <p:sldId id="262" r:id="rId9"/>
   </p:sldIdLst>
   <p:sldSz cx="12192000" cy="6858000"/>
   <p:notesSz cx="6858000" cy="9144000"/>
@@ -5992,7 +5993,7 @@
   <inkml:trace contextRef="#ctx0" brushRef="#br0">671 800,'0'-36,"-41"36,-2 0,1 0,1 0,-2 0,1 0,1 0,-1 0,42 36,-42-36,42 37,-42-1,0 0,42 1,-42-1,42 0,-42-36,42 37,0-1,-42-36,42 36,0 0,0 1,0-1,-41-36,41 36,0 1,0-1,0 0,-43 1,43 0,0 35,0-35,0 35,0-35,0-1,0 0,0 0,0 1,0-1,0 0,0 1,0-1,0 0,43-36,-43 36,0 1,0-1,0 0,41-36,-41 37,42-1,-42 0,42 0,0-36,0 37,0-37,-42 37,42-37,0 36,-1 1,1-37,-42 36,43-36,-43 36,41-36,-41 37,42-37,1 0,-2 0,-41 36,42-36,0 0,0 0,0 0,0-36,42-1,-43 37,1-36,-42 0,43-1,-2 1,1 36,1 0,-43-37,0 0,41-35,-41 36,42-37,0 0,-42 37,42-36,0-1,0 73,-42-36,0-1,42 37,-42 37,42-1,-42 0,0 1,42-37,-42 36,41 0,-41 0,43-36,-43 37,41-1,-41 0,0 1,0-1,42-36,-42 36,43-36,-43 36,41-36,-41 37,0 0,42-37,-42 36,42-36,0 37,0-37,0 0,0 0,0 0,0 0,-1 0,2 0,-2 0,44 0,-2-73,1 36,-42-36,42 37,-42 36,-42-36,42 36,-42-37,0 1,0-37,41 37,-41 0,0 0,0-1,0 1,0-37,0 1,0-37,0 0,-41-37,41 37,-42 0,0 37,42-1,-42 37,42-1,0 1,-42 36,0 0,0 0,0 0,42-36,-42 36,1 0,-2 0,1 0,1 0,-2 0,2 0,-1 0,0 0,0 0,0 0,0 0,0 0,42 36,0 0,-42 1,0-1,42 0,-41-36,-2 37,1-1,1 0,41 0,0 1,-43-37,43 36,-41 37,41-37,-42 0,42 1,-42 0,0-1,0 0,42 1,0-1,0 0,0 1,0-1,0-36</inkml:trace>
   <inkml:trace contextRef="#ctx0" brushRef="#br1" timeOffset="3703.9181">3187 619,'42'0,"-42"36,41 37,2-1,-1 1,-1-1,1-36,-42 1,0 35,0-35,43-37,-43 36,0 0,0 0,0 37,0 0,0 0,41-73,-41 73,0-37,0 0,0 1,0-1,0 0,42-36,-42 36,0 1,42-37,-42 36,0 0,0 0,0 1,42-37,-42 36,0 0,0 1,42-1,-42 0,0 0,0 1,0-1,41-36,2 0,-1 0,-42 36,41-36,2 37,-1-37,-42 36,41-36,1 0,1 0,-2 0,1 0,0 0,0 0,0 0,-42-36,41-1,2 37,-1-36,-1 0,-41-1,43 37,-1-36,41-109,-40 72,-2 1,-41 36,42-1,1 37,-43-36,0 0,0-37,0 1,0 35,0 1,0 0,-43-1,43-36,-83 0,83 37,-43-36,-40-1,-2 37,2-37,83 37,-43 0,2-1,-1 37,0-36,0 0,0 0,1-1,-2 1,1 0,1 36,-1 0,42-37,-43 37,2 0,41-36,-42 36,-1 0,2 0,-1 0,0 0,0 0,0 0,1-36,-2 36,1 0,1 0,-1 0,-1 0,2-36,-1 36,-1 0,2 0,41 0</inkml:trace>
   <inkml:trace contextRef="#ctx0" brushRef="#br2" timeOffset="6215.8407">4696 219,'43'36,"-1"0,-1 37,-41-37,42 0,0 2,0 34,0-36,-42 1,42-1,-42 0,42 1,-42-1,42 0,-42 0,0 1,41-1,2-36,-43 36,0 1,42-37,-42 36,0 0,41 0,-41 1,42-37,-42 36,0 0,43 1,-43-1,0 0,0 0,0 1,41 0,-41-1,42 1,-42-1,42-36,-42 36,42 0,-42 1,42-37,-42 36,0 0,0 1,41-37,2 36,-1 0,-1 0,-41 1,43-1,-1 0,-1 1,1-1,1-36,-2 36,1-36,0 36,0-36,41 37,-40-37,-1 0,-1 0,2 0,-1 0,-1 0,1 0,1 0,40 0,-42-37,2 37,-43-36,42 36,-1-36,2 36,-1 0,41 0,43-73,-83 73,-2 0,1 0,-1 0,2 0,-1 0,-1 0,2 0,-43 0</inkml:trace>
-  <inkml:trace contextRef="#ctx0" brushRef="#br3" timeOffset="8216.067">4696 218,'0'-36,"43"36,-1-36,-1-1,1 37,0 0,0 0,0 0,0 0,0 0,0 0,0 0,0 0,0 0,-1 0,2 0,-1 0,-1 0,43 0,-42 0,0 0,42 0,-42 0,0 0,42 0,-42 0,0 0,0 0,-1 0,2 0,40 0,-40 0,40 0,-41 0,0 0,0 0,0 0,-42 0</inkml:trace>
+  <inkml:trace contextRef="#ctx0" brushRef="#br3" timeOffset="8216.0669">4696 218,'0'-36,"43"36,-1-36,-1-1,1 37,0 0,0 0,0 0,0 0,0 0,0 0,0 0,0 0,0 0,-1 0,2 0,-1 0,-1 0,43 0,-42 0,0 0,42 0,-42 0,0 0,42 0,-42 0,0 0,0 0,-1 0,2 0,40 0,-40 0,40 0,-41 0,0 0,0 0,0 0,-42 0</inkml:trace>
   <inkml:trace contextRef="#ctx0" brushRef="#br4" timeOffset="9367.2734">5326 1454,'0'-38,"42"2,83 0,-41-37,42 1,0 35,-43 1,1 36,0-36,-42 36,0-37,-1 37,2 0,-1 0,41 0,-40 0,-2 0,1 0,1 0,-2-36,-41 36</inkml:trace>
   <inkml:trace contextRef="#ctx0" brushRef="#br5" timeOffset="11815.1725">2264 3343,'42'0,"0"0,0 37,-42-1,41 0,-41 1,43-37,-1 72,-1-35,-41-1,43 0,-1 0,-42 1,0-1,0 0,41-36,-41 37,0-1,42 0,-42 0,43-36,-43 37,41-1,-41 0,0 1,42-37,-42 36,0 0,41-36,-41 37,43 36,-43-37,0 1,0-1,42 0,-1 1,2 35,-43-36,0 1,42 35,-1-35,1-1,-42 0,0 1,43-37,-43 0</inkml:trace>
   <inkml:trace contextRef="#ctx0" brushRef="#br6" timeOffset="13544.0298">1510 3743,'0'-37,"0"1,42 0,0 36,-1 0,2 0,-2 0,1 0,1 0,40 0,1 0,0 0,0 0,42 0,-43 0,1 0,1 0,-2 0,-83-37,42 37,-42-36,42 36,84-73,-43 37,-41-36,42 35,-42 1,42-1,-42 37,42-37,-42 1,0 36,42 0,-42 0,0 0,0 0,-1 0,1 0,1 0,-2 0,1 0,1 36,-2 1,-41 0,42-37,-42 0</inkml:trace>
@@ -21485,6 +21486,346 @@
 <file path=ppt/slides/slide6.xml><?xml version="1.0" encoding="utf-8"?>
 <p:sld xmlns:a="http://schemas.openxmlformats.org/drawingml/2006/main" xmlns:r="http://schemas.openxmlformats.org/officeDocument/2006/relationships" xmlns:p="http://schemas.openxmlformats.org/presentationml/2006/main">
   <p:cSld>
+    <p:spTree>
+      <p:nvGrpSpPr>
+        <p:cNvPr id="1" name=""/>
+        <p:cNvGrpSpPr/>
+        <p:nvPr/>
+      </p:nvGrpSpPr>
+      <p:grpSpPr>
+        <a:xfrm>
+          <a:off x="0" y="0"/>
+          <a:ext cx="0" cy="0"/>
+          <a:chOff x="0" y="0"/>
+          <a:chExt cx="0" cy="0"/>
+        </a:xfrm>
+      </p:grpSpPr>
+      <p:sp>
+        <p:nvSpPr>
+          <p:cNvPr id="2" name="Title 1">
+            <a:extLst>
+              <a:ext uri="{FF2B5EF4-FFF2-40B4-BE49-F238E27FC236}">
+                <a16:creationId xmlns:a16="http://schemas.microsoft.com/office/drawing/2014/main" id="{CB61833C-493E-4282-A03F-20E8A68814F1}"/>
+              </a:ext>
+            </a:extLst>
+          </p:cNvPr>
+          <p:cNvSpPr>
+            <a:spLocks noGrp="1"/>
+          </p:cNvSpPr>
+          <p:nvPr>
+            <p:ph type="title"/>
+          </p:nvPr>
+        </p:nvSpPr>
+        <p:spPr>
+          <a:xfrm>
+            <a:off x="1087120" y="609601"/>
+            <a:ext cx="3362960" cy="508000"/>
+          </a:xfrm>
+        </p:spPr>
+        <p:txBody>
+          <a:bodyPr>
+            <a:normAutofit fontScale="90000"/>
+          </a:bodyPr>
+          <a:lstStyle/>
+          <a:p>
+            <a:r>
+              <a:rPr lang="en-GB" b="1" dirty="0"/>
+              <a:t>Future Goals</a:t>
+            </a:r>
+          </a:p>
+        </p:txBody>
+      </p:sp>
+      <p:sp>
+        <p:nvSpPr>
+          <p:cNvPr id="3" name="Content Placeholder 2">
+            <a:extLst>
+              <a:ext uri="{FF2B5EF4-FFF2-40B4-BE49-F238E27FC236}">
+                <a16:creationId xmlns:a16="http://schemas.microsoft.com/office/drawing/2014/main" id="{5E33CA58-F434-4020-B0B8-3849407C5637}"/>
+              </a:ext>
+            </a:extLst>
+          </p:cNvPr>
+          <p:cNvSpPr>
+            <a:spLocks noGrp="1"/>
+          </p:cNvSpPr>
+          <p:nvPr>
+            <p:ph idx="4294967295"/>
+          </p:nvPr>
+        </p:nvSpPr>
+        <p:spPr>
+          <a:xfrm>
+            <a:off x="0" y="1117601"/>
+            <a:ext cx="10131425" cy="945449"/>
+          </a:xfrm>
+        </p:spPr>
+        <p:txBody>
+          <a:bodyPr/>
+          <a:lstStyle/>
+          <a:p>
+            <a:pPr>
+              <a:buFont typeface="Wingdings" panose="05000000000000000000" pitchFamily="2" charset="2"/>
+              <a:buChar char="v"/>
+            </a:pPr>
+            <a:r>
+              <a:rPr lang="en-GB" dirty="0"/>
+              <a:t>Making 3D models using JSON to represent the main obstacles in the game</a:t>
+            </a:r>
+          </a:p>
+          <a:p>
+            <a:pPr marL="0" indent="0">
+              <a:buNone/>
+            </a:pPr>
+            <a:endParaRPr lang="en-GB" dirty="0"/>
+          </a:p>
+        </p:txBody>
+      </p:sp>
+      <p:pic>
+        <p:nvPicPr>
+          <p:cNvPr id="5" name="Picture 4" descr="A flock of birds&#10;&#10;Description generated with very high confidence">
+            <a:extLst>
+              <a:ext uri="{FF2B5EF4-FFF2-40B4-BE49-F238E27FC236}">
+                <a16:creationId xmlns:a16="http://schemas.microsoft.com/office/drawing/2014/main" id="{4107CBA0-A754-4F53-8100-3DE0E3B5EA5E}"/>
+              </a:ext>
+            </a:extLst>
+          </p:cNvPr>
+          <p:cNvPicPr>
+            <a:picLocks noChangeAspect="1"/>
+          </p:cNvPicPr>
+          <p:nvPr/>
+        </p:nvPicPr>
+        <p:blipFill rotWithShape="1">
+          <a:blip r:embed="rId2"/>
+          <a:srcRect t="-4973" r="50877" b="-376"/>
+          <a:stretch/>
+        </p:blipFill>
+        <p:spPr>
+          <a:xfrm>
+            <a:off x="3796906" y="1502230"/>
+            <a:ext cx="2301815" cy="1866416"/>
+          </a:xfrm>
+          <a:prstGeom prst="rect">
+            <a:avLst/>
+          </a:prstGeom>
+        </p:spPr>
+      </p:pic>
+      <p:sp>
+        <p:nvSpPr>
+          <p:cNvPr id="6" name="TextBox 5">
+            <a:extLst>
+              <a:ext uri="{FF2B5EF4-FFF2-40B4-BE49-F238E27FC236}">
+                <a16:creationId xmlns:a16="http://schemas.microsoft.com/office/drawing/2014/main" id="{FA6C9D5E-CF0C-4082-8403-94876BAE598C}"/>
+              </a:ext>
+            </a:extLst>
+          </p:cNvPr>
+          <p:cNvSpPr txBox="1"/>
+          <p:nvPr/>
+        </p:nvSpPr>
+        <p:spPr>
+          <a:xfrm>
+            <a:off x="1150342" y="1784646"/>
+            <a:ext cx="5516880" cy="4247317"/>
+          </a:xfrm>
+          <a:prstGeom prst="rect">
+            <a:avLst/>
+          </a:prstGeom>
+          <a:noFill/>
+        </p:spPr>
+        <p:txBody>
+          <a:bodyPr wrap="square" rtlCol="0">
+            <a:spAutoFit/>
+          </a:bodyPr>
+          <a:lstStyle/>
+          <a:p>
+            <a:pPr marL="285750" indent="-285750">
+              <a:buFont typeface="Wingdings" panose="05000000000000000000" pitchFamily="2" charset="2"/>
+              <a:buChar char="v"/>
+            </a:pPr>
+            <a:r>
+              <a:rPr lang="en-GB" dirty="0"/>
+              <a:t>People’s unawareness</a:t>
+            </a:r>
+          </a:p>
+          <a:p>
+            <a:pPr marL="285750" indent="-285750">
+              <a:buFont typeface="Wingdings" panose="05000000000000000000" pitchFamily="2" charset="2"/>
+              <a:buChar char="v"/>
+            </a:pPr>
+            <a:endParaRPr lang="en-GB" dirty="0"/>
+          </a:p>
+          <a:p>
+            <a:pPr marL="285750" indent="-285750">
+              <a:buFont typeface="Wingdings" panose="05000000000000000000" pitchFamily="2" charset="2"/>
+              <a:buChar char="v"/>
+            </a:pPr>
+            <a:endParaRPr lang="en-GB" dirty="0"/>
+          </a:p>
+          <a:p>
+            <a:pPr marL="285750" indent="-285750">
+              <a:buFont typeface="Wingdings" panose="05000000000000000000" pitchFamily="2" charset="2"/>
+              <a:buChar char="v"/>
+            </a:pPr>
+            <a:endParaRPr lang="en-GB" dirty="0"/>
+          </a:p>
+          <a:p>
+            <a:pPr marL="285750" indent="-285750">
+              <a:buFont typeface="Wingdings" panose="05000000000000000000" pitchFamily="2" charset="2"/>
+              <a:buChar char="v"/>
+            </a:pPr>
+            <a:endParaRPr lang="en-GB" dirty="0"/>
+          </a:p>
+          <a:p>
+            <a:pPr marL="285750" indent="-285750">
+              <a:buFont typeface="Wingdings" panose="05000000000000000000" pitchFamily="2" charset="2"/>
+              <a:buChar char="v"/>
+            </a:pPr>
+            <a:endParaRPr lang="en-GB" dirty="0"/>
+          </a:p>
+          <a:p>
+            <a:pPr marL="285750" indent="-285750">
+              <a:buFont typeface="Wingdings" panose="05000000000000000000" pitchFamily="2" charset="2"/>
+              <a:buChar char="v"/>
+            </a:pPr>
+            <a:endParaRPr lang="en-GB" dirty="0"/>
+          </a:p>
+          <a:p>
+            <a:pPr marL="285750" indent="-285750">
+              <a:buFont typeface="Wingdings" panose="05000000000000000000" pitchFamily="2" charset="2"/>
+              <a:buChar char="v"/>
+            </a:pPr>
+            <a:r>
+              <a:rPr lang="en-GB" dirty="0"/>
+              <a:t>Drugs                                                                                      </a:t>
+            </a:r>
+          </a:p>
+          <a:p>
+            <a:pPr marL="285750" indent="-285750">
+              <a:buFont typeface="Wingdings" panose="05000000000000000000" pitchFamily="2" charset="2"/>
+              <a:buChar char="v"/>
+            </a:pPr>
+            <a:endParaRPr lang="en-GB" dirty="0"/>
+          </a:p>
+          <a:p>
+            <a:pPr marL="285750" indent="-285750">
+              <a:buFont typeface="Wingdings" panose="05000000000000000000" pitchFamily="2" charset="2"/>
+              <a:buChar char="v"/>
+            </a:pPr>
+            <a:endParaRPr lang="en-GB" dirty="0"/>
+          </a:p>
+          <a:p>
+            <a:pPr marL="285750" indent="-285750">
+              <a:buFont typeface="Wingdings" panose="05000000000000000000" pitchFamily="2" charset="2"/>
+              <a:buChar char="v"/>
+            </a:pPr>
+            <a:endParaRPr lang="en-GB" dirty="0"/>
+          </a:p>
+          <a:p>
+            <a:pPr marL="285750" indent="-285750">
+              <a:buFont typeface="Wingdings" panose="05000000000000000000" pitchFamily="2" charset="2"/>
+              <a:buChar char="v"/>
+            </a:pPr>
+            <a:endParaRPr lang="en-GB" dirty="0"/>
+          </a:p>
+          <a:p>
+            <a:pPr marL="285750" indent="-285750">
+              <a:buFont typeface="Wingdings" panose="05000000000000000000" pitchFamily="2" charset="2"/>
+              <a:buChar char="v"/>
+            </a:pPr>
+            <a:endParaRPr lang="en-GB" dirty="0"/>
+          </a:p>
+          <a:p>
+            <a:pPr marL="285750" indent="-285750">
+              <a:buFont typeface="Wingdings" panose="05000000000000000000" pitchFamily="2" charset="2"/>
+              <a:buChar char="v"/>
+            </a:pPr>
+            <a:endParaRPr lang="en-GB" dirty="0"/>
+          </a:p>
+          <a:p>
+            <a:pPr marL="285750" indent="-285750">
+              <a:buFont typeface="Wingdings" panose="05000000000000000000" pitchFamily="2" charset="2"/>
+              <a:buChar char="v"/>
+            </a:pPr>
+            <a:r>
+              <a:rPr lang="en-GB" dirty="0"/>
+              <a:t>Money</a:t>
+            </a:r>
+          </a:p>
+        </p:txBody>
+      </p:sp>
+      <p:pic>
+        <p:nvPicPr>
+          <p:cNvPr id="8" name="Picture 7" descr="A close up of a sign&#10;&#10;Description generated with very high confidence">
+            <a:extLst>
+              <a:ext uri="{FF2B5EF4-FFF2-40B4-BE49-F238E27FC236}">
+                <a16:creationId xmlns:a16="http://schemas.microsoft.com/office/drawing/2014/main" id="{AEC01B49-3322-4202-B8D3-1405EFF45204}"/>
+              </a:ext>
+            </a:extLst>
+          </p:cNvPr>
+          <p:cNvPicPr>
+            <a:picLocks noChangeAspect="1"/>
+          </p:cNvPicPr>
+          <p:nvPr/>
+        </p:nvPicPr>
+        <p:blipFill>
+          <a:blip r:embed="rId3"/>
+          <a:stretch>
+            <a:fillRect/>
+          </a:stretch>
+        </p:blipFill>
+        <p:spPr>
+          <a:xfrm>
+            <a:off x="3893475" y="3651062"/>
+            <a:ext cx="2205246" cy="1400572"/>
+          </a:xfrm>
+          <a:prstGeom prst="rect">
+            <a:avLst/>
+          </a:prstGeom>
+        </p:spPr>
+      </p:pic>
+      <p:pic>
+        <p:nvPicPr>
+          <p:cNvPr id="10" name="Picture 9" descr="A drawing of a face&#10;&#10;Description generated with high confidence">
+            <a:extLst>
+              <a:ext uri="{FF2B5EF4-FFF2-40B4-BE49-F238E27FC236}">
+                <a16:creationId xmlns:a16="http://schemas.microsoft.com/office/drawing/2014/main" id="{54A2D993-0C39-4C0F-A557-394DABF59A94}"/>
+              </a:ext>
+            </a:extLst>
+          </p:cNvPr>
+          <p:cNvPicPr>
+            <a:picLocks noChangeAspect="1"/>
+          </p:cNvPicPr>
+          <p:nvPr/>
+        </p:nvPicPr>
+        <p:blipFill>
+          <a:blip r:embed="rId4"/>
+          <a:stretch>
+            <a:fillRect/>
+          </a:stretch>
+        </p:blipFill>
+        <p:spPr>
+          <a:xfrm>
+            <a:off x="4329881" y="5309705"/>
+            <a:ext cx="1332434" cy="1289662"/>
+          </a:xfrm>
+          <a:prstGeom prst="rect">
+            <a:avLst/>
+          </a:prstGeom>
+        </p:spPr>
+      </p:pic>
+    </p:spTree>
+    <p:extLst>
+      <p:ext uri="{BB962C8B-B14F-4D97-AF65-F5344CB8AC3E}">
+        <p14:creationId xmlns:p14="http://schemas.microsoft.com/office/powerpoint/2010/main" val="2085506538"/>
+      </p:ext>
+    </p:extLst>
+  </p:cSld>
+  <p:clrMapOvr>
+    <a:masterClrMapping/>
+  </p:clrMapOvr>
+</p:sld>
+</file>
+
+<file path=ppt/slides/slide7.xml><?xml version="1.0" encoding="utf-8"?>
+<p:sld xmlns:a="http://schemas.openxmlformats.org/drawingml/2006/main" xmlns:r="http://schemas.openxmlformats.org/officeDocument/2006/relationships" xmlns:p="http://schemas.openxmlformats.org/presentationml/2006/main">
+  <p:cSld>
     <p:bg>
       <p:bgPr>
         <a:blipFill>
@@ -29979,7 +30320,7 @@
 </p:sld>
 </file>
 
-<file path=ppt/slides/slide7.xml><?xml version="1.0" encoding="utf-8"?>
+<file path=ppt/slides/slide8.xml><?xml version="1.0" encoding="utf-8"?>
 <p:sld xmlns:a="http://schemas.openxmlformats.org/drawingml/2006/main" xmlns:r="http://schemas.openxmlformats.org/officeDocument/2006/relationships" xmlns:p="http://schemas.openxmlformats.org/presentationml/2006/main">
   <p:cSld>
     <p:bg>
@@ -30145,8 +30486,8 @@
           </a:p>
         </p:txBody>
       </p:sp>
-      <mc:AlternateContent xmlns:mc="http://schemas.openxmlformats.org/markup-compatibility/2006">
-        <mc:Choice xmlns:p14="http://schemas.microsoft.com/office/powerpoint/2010/main" xmlns:aink="http://schemas.microsoft.com/office/drawing/2016/ink" Requires="p14 aink">
+      <mc:AlternateContent xmlns:mc="http://schemas.openxmlformats.org/markup-compatibility/2006" xmlns:p14="http://schemas.microsoft.com/office/powerpoint/2010/main" xmlns:aink="http://schemas.microsoft.com/office/drawing/2016/ink">
+        <mc:Choice Requires="p14 aink">
           <p:contentPart p14:bwMode="auto" r:id="rId5">
             <p14:nvContentPartPr>
               <p14:cNvPr id="132" name="Ink 131">
@@ -30165,7 +30506,7 @@
             </p14:xfrm>
           </p:contentPart>
         </mc:Choice>
-        <mc:Fallback>
+        <mc:Fallback xmlns="">
           <p:pic>
             <p:nvPicPr>
               <p:cNvPr id="132" name="Ink 131">

</xml_diff>